<commit_message>
update figures, adaptive bot analyses
</commit_message>
<xml_diff>
--- a/figures/stable_bot_overview.pptx
+++ b/figures/stable_bot_overview.pptx
@@ -379,7 +379,7 @@
           <a:p>
             <a:fld id="{0C1A3CDD-DFAE-CC43-8C26-DEC1B5C5DEF1}" type="datetimeFigureOut">
               <a:rPr lang="en-US" smtClean="0"/>
-              <a:t>10/30/22</a:t>
+              <a:t>4/23/23</a:t>
             </a:fld>
             <a:endParaRPr lang="en-US"/>
           </a:p>
@@ -549,7 +549,7 @@
           <a:p>
             <a:fld id="{0C1A3CDD-DFAE-CC43-8C26-DEC1B5C5DEF1}" type="datetimeFigureOut">
               <a:rPr lang="en-US" smtClean="0"/>
-              <a:t>10/30/22</a:t>
+              <a:t>4/23/23</a:t>
             </a:fld>
             <a:endParaRPr lang="en-US"/>
           </a:p>
@@ -729,7 +729,7 @@
           <a:p>
             <a:fld id="{0C1A3CDD-DFAE-CC43-8C26-DEC1B5C5DEF1}" type="datetimeFigureOut">
               <a:rPr lang="en-US" smtClean="0"/>
-              <a:t>10/30/22</a:t>
+              <a:t>4/23/23</a:t>
             </a:fld>
             <a:endParaRPr lang="en-US"/>
           </a:p>
@@ -899,7 +899,7 @@
           <a:p>
             <a:fld id="{0C1A3CDD-DFAE-CC43-8C26-DEC1B5C5DEF1}" type="datetimeFigureOut">
               <a:rPr lang="en-US" smtClean="0"/>
-              <a:t>10/30/22</a:t>
+              <a:t>4/23/23</a:t>
             </a:fld>
             <a:endParaRPr lang="en-US"/>
           </a:p>
@@ -1145,7 +1145,7 @@
           <a:p>
             <a:fld id="{0C1A3CDD-DFAE-CC43-8C26-DEC1B5C5DEF1}" type="datetimeFigureOut">
               <a:rPr lang="en-US" smtClean="0"/>
-              <a:t>10/30/22</a:t>
+              <a:t>4/23/23</a:t>
             </a:fld>
             <a:endParaRPr lang="en-US"/>
           </a:p>
@@ -1377,7 +1377,7 @@
           <a:p>
             <a:fld id="{0C1A3CDD-DFAE-CC43-8C26-DEC1B5C5DEF1}" type="datetimeFigureOut">
               <a:rPr lang="en-US" smtClean="0"/>
-              <a:t>10/30/22</a:t>
+              <a:t>4/23/23</a:t>
             </a:fld>
             <a:endParaRPr lang="en-US"/>
           </a:p>
@@ -1744,7 +1744,7 @@
           <a:p>
             <a:fld id="{0C1A3CDD-DFAE-CC43-8C26-DEC1B5C5DEF1}" type="datetimeFigureOut">
               <a:rPr lang="en-US" smtClean="0"/>
-              <a:t>10/30/22</a:t>
+              <a:t>4/23/23</a:t>
             </a:fld>
             <a:endParaRPr lang="en-US"/>
           </a:p>
@@ -1862,7 +1862,7 @@
           <a:p>
             <a:fld id="{0C1A3CDD-DFAE-CC43-8C26-DEC1B5C5DEF1}" type="datetimeFigureOut">
               <a:rPr lang="en-US" smtClean="0"/>
-              <a:t>10/30/22</a:t>
+              <a:t>4/23/23</a:t>
             </a:fld>
             <a:endParaRPr lang="en-US"/>
           </a:p>
@@ -1957,7 +1957,7 @@
           <a:p>
             <a:fld id="{0C1A3CDD-DFAE-CC43-8C26-DEC1B5C5DEF1}" type="datetimeFigureOut">
               <a:rPr lang="en-US" smtClean="0"/>
-              <a:t>10/30/22</a:t>
+              <a:t>4/23/23</a:t>
             </a:fld>
             <a:endParaRPr lang="en-US"/>
           </a:p>
@@ -2234,7 +2234,7 @@
           <a:p>
             <a:fld id="{0C1A3CDD-DFAE-CC43-8C26-DEC1B5C5DEF1}" type="datetimeFigureOut">
               <a:rPr lang="en-US" smtClean="0"/>
-              <a:t>10/30/22</a:t>
+              <a:t>4/23/23</a:t>
             </a:fld>
             <a:endParaRPr lang="en-US"/>
           </a:p>
@@ -2491,7 +2491,7 @@
           <a:p>
             <a:fld id="{0C1A3CDD-DFAE-CC43-8C26-DEC1B5C5DEF1}" type="datetimeFigureOut">
               <a:rPr lang="en-US" smtClean="0"/>
-              <a:t>10/30/22</a:t>
+              <a:t>4/23/23</a:t>
             </a:fld>
             <a:endParaRPr lang="en-US"/>
           </a:p>
@@ -2704,7 +2704,7 @@
           <a:p>
             <a:fld id="{0C1A3CDD-DFAE-CC43-8C26-DEC1B5C5DEF1}" type="datetimeFigureOut">
               <a:rPr lang="en-US" smtClean="0"/>
-              <a:t>10/30/22</a:t>
+              <a:t>4/23/23</a:t>
             </a:fld>
             <a:endParaRPr lang="en-US"/>
           </a:p>
@@ -4646,7 +4646,7 @@
                 </a:solidFill>
                 <a:latin typeface="Avenir Book" panose="02000503020000020003" pitchFamily="2" charset="0"/>
               </a:rPr>
-              <a:t>5. Win-positive-lose-negative</a:t>
+              <a:t>5. Win-positive lose-negative</a:t>
             </a:r>
           </a:p>
           <a:p>
@@ -4657,7 +4657,7 @@
                 </a:solidFill>
                 <a:latin typeface="Avenir Book" panose="02000503020000020003" pitchFamily="2" charset="0"/>
               </a:rPr>
-              <a:t>6. Win-stay-lose-positive</a:t>
+              <a:t>6. Win-stay lose-positive</a:t>
             </a:r>
           </a:p>
           <a:p>

</xml_diff>